<commit_message>
Change UserConnection to User in snapshot
</commit_message>
<xml_diff>
--- a/docs/Snapshot Diagram.pptx
+++ b/docs/Snapshot Diagram.pptx
@@ -3192,14 +3192,14 @@
           <a:p>
             <a:pPr algn="ctr"/>
             <a:r>
-              <a:rPr lang="en-US" sz="2000" dirty="0" err="1" smtClean="0">
+              <a:rPr lang="en-US" sz="2000" dirty="0" smtClean="0">
                 <a:solidFill>
                   <a:schemeClr val="tx1"/>
                 </a:solidFill>
                 <a:latin typeface="Times"/>
                 <a:cs typeface="Times"/>
               </a:rPr>
-              <a:t>UserConnection</a:t>
+              <a:t>User</a:t>
             </a:r>
             <a:endParaRPr lang="en-US" sz="2000" dirty="0">
               <a:solidFill>

</xml_diff>